<commit_message>
Presentatie geupdate (letters groter, sheet leesbaarder)
</commit_message>
<xml_diff>
--- a/Case presentatie~6.pptx
+++ b/Case presentatie~6.pptx
@@ -12,11 +12,12 @@
     <p:sldId id="272" r:id="rId6"/>
     <p:sldId id="277" r:id="rId7"/>
     <p:sldId id="278" r:id="rId8"/>
-    <p:sldId id="263" r:id="rId9"/>
-    <p:sldId id="271" r:id="rId10"/>
-    <p:sldId id="279" r:id="rId11"/>
-    <p:sldId id="260" r:id="rId12"/>
-    <p:sldId id="268" r:id="rId13"/>
+    <p:sldId id="283" r:id="rId9"/>
+    <p:sldId id="284" r:id="rId10"/>
+    <p:sldId id="282" r:id="rId11"/>
+    <p:sldId id="279" r:id="rId12"/>
+    <p:sldId id="260" r:id="rId13"/>
+    <p:sldId id="285" r:id="rId14"/>
   </p:sldIdLst>
   <p:sldSz cx="9144000" cy="6858000" type="screen4x3"/>
   <p:notesSz cx="6858000" cy="9144000"/>
@@ -3169,8 +3170,8 @@
         </p:blipFill>
         <p:spPr bwMode="auto">
           <a:xfrm>
-            <a:off x="6388464" y="4297702"/>
-            <a:ext cx="2753308" cy="2560712"/>
+            <a:off x="6228664" y="4149080"/>
+            <a:ext cx="2913108" cy="2709334"/>
           </a:xfrm>
           <a:prstGeom prst="rect">
             <a:avLst/>
@@ -3302,6 +3303,321 @@
             <a:pPr algn="l"/>
             <a:r>
               <a:rPr lang="nl-NL" sz="3600" dirty="0" smtClean="0"/>
+              <a:t>Poker | </a:t>
+            </a:r>
+            <a:r>
+              <a:rPr lang="nl-NL" sz="3600" dirty="0" err="1" smtClean="0"/>
+              <a:t>JUnitTest</a:t>
+            </a:r>
+            <a:endParaRPr lang="nl-NL" sz="3600" dirty="0"/>
+          </a:p>
+        </p:txBody>
+      </p:sp>
+      <p:cxnSp>
+        <p:nvCxnSpPr>
+          <p:cNvPr id="5" name="Rechte verbindingslijn 4"/>
+          <p:cNvCxnSpPr/>
+          <p:nvPr/>
+        </p:nvCxnSpPr>
+        <p:spPr>
+          <a:xfrm>
+            <a:off x="323528" y="1052736"/>
+            <a:ext cx="8568952" cy="0"/>
+          </a:xfrm>
+          <a:prstGeom prst="line">
+            <a:avLst/>
+          </a:prstGeom>
+        </p:spPr>
+        <p:style>
+          <a:lnRef idx="1">
+            <a:schemeClr val="accent1"/>
+          </a:lnRef>
+          <a:fillRef idx="0">
+            <a:schemeClr val="accent1"/>
+          </a:fillRef>
+          <a:effectRef idx="0">
+            <a:schemeClr val="accent1"/>
+          </a:effectRef>
+          <a:fontRef idx="minor">
+            <a:schemeClr val="tx1"/>
+          </a:fontRef>
+        </p:style>
+      </p:cxnSp>
+      <p:sp>
+        <p:nvSpPr>
+          <p:cNvPr id="17" name="Titel 1"/>
+          <p:cNvSpPr txBox="1">
+            <a:spLocks/>
+          </p:cNvSpPr>
+          <p:nvPr/>
+        </p:nvSpPr>
+        <p:spPr>
+          <a:xfrm>
+            <a:off x="252238" y="1133852"/>
+            <a:ext cx="6335986" cy="409761"/>
+          </a:xfrm>
+          <a:prstGeom prst="rect">
+            <a:avLst/>
+          </a:prstGeom>
+        </p:spPr>
+        <p:txBody>
+          <a:bodyPr vert="horz" lIns="91440" tIns="45720" rIns="91440" bIns="45720" rtlCol="0" anchor="ctr">
+            <a:noAutofit/>
+          </a:bodyPr>
+          <a:lstStyle>
+            <a:lvl1pPr algn="ctr" defTabSz="914400" rtl="0" eaLnBrk="1" latinLnBrk="0" hangingPunct="1">
+              <a:spcBef>
+                <a:spcPct val="0"/>
+              </a:spcBef>
+              <a:buNone/>
+              <a:defRPr sz="4400" kern="1200">
+                <a:solidFill>
+                  <a:schemeClr val="tx1"/>
+                </a:solidFill>
+                <a:latin typeface="+mj-lt"/>
+                <a:ea typeface="+mj-ea"/>
+                <a:cs typeface="+mj-cs"/>
+              </a:defRPr>
+            </a:lvl1pPr>
+          </a:lstStyle>
+          <a:p>
+            <a:pPr algn="l"/>
+            <a:r>
+              <a:rPr lang="nl-NL" sz="2000" dirty="0" smtClean="0"/>
+              <a:t>De </a:t>
+            </a:r>
+            <a:r>
+              <a:rPr lang="nl-NL" sz="2000" dirty="0" err="1" smtClean="0"/>
+              <a:t>getScore</a:t>
+            </a:r>
+            <a:r>
+              <a:rPr lang="nl-NL" sz="2000" dirty="0" smtClean="0"/>
+              <a:t> functie hebben wij uitgebreid getest met </a:t>
+            </a:r>
+            <a:r>
+              <a:rPr lang="nl-NL" sz="2000" dirty="0" err="1" smtClean="0"/>
+              <a:t>JUnit</a:t>
+            </a:r>
+            <a:endParaRPr lang="nl-NL" sz="2000" dirty="0"/>
+          </a:p>
+        </p:txBody>
+      </p:sp>
+      <p:pic>
+        <p:nvPicPr>
+          <p:cNvPr id="1026" name="Picture 2"/>
+          <p:cNvPicPr>
+            <a:picLocks noChangeAspect="1" noChangeArrowheads="1"/>
+          </p:cNvPicPr>
+          <p:nvPr/>
+        </p:nvPicPr>
+        <p:blipFill>
+          <a:blip r:embed="rId2">
+            <a:extLst>
+              <a:ext uri="{28A0092B-C50C-407E-A947-70E740481C1C}">
+                <a14:useLocalDpi xmlns:a14="http://schemas.microsoft.com/office/drawing/2010/main" val="0"/>
+              </a:ext>
+            </a:extLst>
+          </a:blip>
+          <a:srcRect/>
+          <a:stretch>
+            <a:fillRect/>
+          </a:stretch>
+        </p:blipFill>
+        <p:spPr bwMode="auto">
+          <a:xfrm>
+            <a:off x="144462" y="1605558"/>
+            <a:ext cx="5203679" cy="4047306"/>
+          </a:xfrm>
+          <a:prstGeom prst="rect">
+            <a:avLst/>
+          </a:prstGeom>
+          <a:noFill/>
+          <a:ln>
+            <a:noFill/>
+          </a:ln>
+          <a:extLst>
+            <a:ext uri="{909E8E84-426E-40DD-AFC4-6F175D3DCCD1}">
+              <a14:hiddenFill xmlns:a14="http://schemas.microsoft.com/office/drawing/2010/main">
+                <a:solidFill>
+                  <a:schemeClr val="accent1"/>
+                </a:solidFill>
+              </a14:hiddenFill>
+            </a:ext>
+            <a:ext uri="{91240B29-F687-4F45-9708-019B960494DF}">
+              <a14:hiddenLine xmlns:a14="http://schemas.microsoft.com/office/drawing/2010/main" w="9525">
+                <a:solidFill>
+                  <a:schemeClr val="tx1"/>
+                </a:solidFill>
+                <a:miter lim="800000"/>
+                <a:headEnd/>
+                <a:tailEnd/>
+              </a14:hiddenLine>
+            </a:ext>
+          </a:extLst>
+        </p:spPr>
+      </p:pic>
+      <p:pic>
+        <p:nvPicPr>
+          <p:cNvPr id="1027" name="Picture 3"/>
+          <p:cNvPicPr>
+            <a:picLocks noChangeAspect="1" noChangeArrowheads="1"/>
+          </p:cNvPicPr>
+          <p:nvPr/>
+        </p:nvPicPr>
+        <p:blipFill>
+          <a:blip r:embed="rId3">
+            <a:extLst>
+              <a:ext uri="{28A0092B-C50C-407E-A947-70E740481C1C}">
+                <a14:useLocalDpi xmlns:a14="http://schemas.microsoft.com/office/drawing/2010/main" val="0"/>
+              </a:ext>
+            </a:extLst>
+          </a:blip>
+          <a:srcRect/>
+          <a:stretch>
+            <a:fillRect/>
+          </a:stretch>
+        </p:blipFill>
+        <p:spPr bwMode="auto">
+          <a:xfrm>
+            <a:off x="5819031" y="1988840"/>
+            <a:ext cx="2956867" cy="887060"/>
+          </a:xfrm>
+          <a:prstGeom prst="rect">
+            <a:avLst/>
+          </a:prstGeom>
+          <a:noFill/>
+          <a:ln>
+            <a:noFill/>
+          </a:ln>
+          <a:extLst>
+            <a:ext uri="{909E8E84-426E-40DD-AFC4-6F175D3DCCD1}">
+              <a14:hiddenFill xmlns:a14="http://schemas.microsoft.com/office/drawing/2010/main">
+                <a:solidFill>
+                  <a:schemeClr val="accent1"/>
+                </a:solidFill>
+              </a14:hiddenFill>
+            </a:ext>
+            <a:ext uri="{91240B29-F687-4F45-9708-019B960494DF}">
+              <a14:hiddenLine xmlns:a14="http://schemas.microsoft.com/office/drawing/2010/main" w="9525">
+                <a:solidFill>
+                  <a:schemeClr val="tx1"/>
+                </a:solidFill>
+                <a:miter lim="800000"/>
+                <a:headEnd/>
+                <a:tailEnd/>
+              </a14:hiddenLine>
+            </a:ext>
+          </a:extLst>
+        </p:spPr>
+      </p:pic>
+      <p:sp>
+        <p:nvSpPr>
+          <p:cNvPr id="9" name="Rechthoek 8"/>
+          <p:cNvSpPr/>
+          <p:nvPr/>
+        </p:nvSpPr>
+        <p:spPr>
+          <a:xfrm>
+            <a:off x="5808173" y="1980837"/>
+            <a:ext cx="2967725" cy="895064"/>
+          </a:xfrm>
+          <a:prstGeom prst="rect">
+            <a:avLst/>
+          </a:prstGeom>
+          <a:noFill/>
+          <a:ln w="12700">
+            <a:solidFill>
+              <a:srgbClr val="53A9FF"/>
+            </a:solidFill>
+          </a:ln>
+        </p:spPr>
+        <p:style>
+          <a:lnRef idx="2">
+            <a:schemeClr val="accent1">
+              <a:shade val="50000"/>
+            </a:schemeClr>
+          </a:lnRef>
+          <a:fillRef idx="1">
+            <a:schemeClr val="accent1"/>
+          </a:fillRef>
+          <a:effectRef idx="0">
+            <a:schemeClr val="accent1"/>
+          </a:effectRef>
+          <a:fontRef idx="minor">
+            <a:schemeClr val="lt1"/>
+          </a:fontRef>
+        </p:style>
+        <p:txBody>
+          <a:bodyPr rtlCol="0" anchor="ctr"/>
+          <a:lstStyle/>
+          <a:p>
+            <a:pPr algn="ctr"/>
+            <a:endParaRPr lang="nl-NL"/>
+          </a:p>
+        </p:txBody>
+      </p:sp>
+    </p:spTree>
+    <p:extLst>
+      <p:ext uri="{BB962C8B-B14F-4D97-AF65-F5344CB8AC3E}">
+        <p14:creationId xmlns:p14="http://schemas.microsoft.com/office/powerpoint/2010/main" val="49625510"/>
+      </p:ext>
+    </p:extLst>
+  </p:cSld>
+  <p:clrMapOvr>
+    <a:masterClrMapping/>
+  </p:clrMapOvr>
+  <p:timing>
+    <p:tnLst>
+      <p:par>
+        <p:cTn id="1" dur="indefinite" restart="never" nodeType="tmRoot"/>
+      </p:par>
+    </p:tnLst>
+  </p:timing>
+</p:sld>
+</file>
+
+<file path=ppt/slides/slide11.xml><?xml version="1.0" encoding="utf-8"?>
+<p:sld xmlns:a="http://schemas.openxmlformats.org/drawingml/2006/main" xmlns:r="http://schemas.openxmlformats.org/officeDocument/2006/relationships" xmlns:p="http://schemas.openxmlformats.org/presentationml/2006/main">
+  <p:cSld>
+    <p:spTree>
+      <p:nvGrpSpPr>
+        <p:cNvPr id="1" name=""/>
+        <p:cNvGrpSpPr/>
+        <p:nvPr/>
+      </p:nvGrpSpPr>
+      <p:grpSpPr>
+        <a:xfrm>
+          <a:off x="0" y="0"/>
+          <a:ext cx="0" cy="0"/>
+          <a:chOff x="0" y="0"/>
+          <a:chExt cx="0" cy="0"/>
+        </a:xfrm>
+      </p:grpSpPr>
+      <p:sp>
+        <p:nvSpPr>
+          <p:cNvPr id="2" name="Titel 1"/>
+          <p:cNvSpPr>
+            <a:spLocks noGrp="1"/>
+          </p:cNvSpPr>
+          <p:nvPr>
+            <p:ph type="ctrTitle"/>
+          </p:nvPr>
+        </p:nvSpPr>
+        <p:spPr>
+          <a:xfrm>
+            <a:off x="234628" y="305222"/>
+            <a:ext cx="7772400" cy="819522"/>
+          </a:xfrm>
+        </p:spPr>
+        <p:txBody>
+          <a:bodyPr>
+            <a:normAutofit/>
+          </a:bodyPr>
+          <a:lstStyle/>
+          <a:p>
+            <a:pPr algn="l"/>
+            <a:r>
+              <a:rPr lang="nl-NL" sz="3600" dirty="0" smtClean="0"/>
               <a:t>Klaverjassen | </a:t>
             </a:r>
             <a:r>
@@ -3464,7 +3780,7 @@
 </p:sld>
 </file>
 
-<file path=ppt/slides/slide11.xml><?xml version="1.0" encoding="utf-8"?>
+<file path=ppt/slides/slide12.xml><?xml version="1.0" encoding="utf-8"?>
 <p:sld xmlns:a="http://schemas.openxmlformats.org/drawingml/2006/main" xmlns:r="http://schemas.openxmlformats.org/officeDocument/2006/relationships" xmlns:p="http://schemas.openxmlformats.org/presentationml/2006/main">
   <p:cSld>
     <p:spTree>
@@ -3555,7 +3871,7 @@
         </p:nvSpPr>
         <p:spPr>
           <a:xfrm>
-            <a:off x="380950" y="1747466"/>
+            <a:off x="380950" y="1667564"/>
             <a:ext cx="7772400" cy="2054274"/>
           </a:xfrm>
           <a:prstGeom prst="rect">
@@ -3564,7 +3880,7 @@
         </p:spPr>
         <p:txBody>
           <a:bodyPr vert="horz" lIns="91440" tIns="45720" rIns="91440" bIns="45720" rtlCol="0" anchor="t" anchorCtr="0">
-            <a:normAutofit fontScale="92500" lnSpcReduction="10000"/>
+            <a:noAutofit/>
           </a:bodyPr>
           <a:lstStyle>
             <a:lvl1pPr algn="ctr" defTabSz="914400" rtl="0" eaLnBrk="1" latinLnBrk="0" hangingPunct="1">
@@ -3584,16 +3900,100 @@
           </a:lstStyle>
           <a:p>
             <a:pPr marL="355600" indent="-355600" algn="l">
+              <a:buFont typeface="Arial" panose="020B0604020202020204" pitchFamily="34" charset="0"/>
+              <a:buChar char="•"/>
+            </a:pPr>
+            <a:r>
+              <a:rPr lang="nl-NL" sz="2400" dirty="0" smtClean="0"/>
+              <a:t>Werkende software </a:t>
+            </a:r>
+          </a:p>
+          <a:p>
+            <a:pPr marL="355600" indent="-355600" algn="l">
+              <a:buFont typeface="Arial" panose="020B0604020202020204" pitchFamily="34" charset="0"/>
+              <a:buChar char="•"/>
+            </a:pPr>
+            <a:r>
+              <a:rPr lang="nl-NL" sz="2400" dirty="0" err="1" smtClean="0"/>
+              <a:t>Artificial</a:t>
+            </a:r>
+            <a:r>
+              <a:rPr lang="nl-NL" sz="2400" dirty="0" smtClean="0"/>
+              <a:t> Intelligence </a:t>
+            </a:r>
+          </a:p>
+          <a:p>
+            <a:pPr marL="355600" indent="-355600" algn="l">
+              <a:buFont typeface="Arial" panose="020B0604020202020204" pitchFamily="34" charset="0"/>
+              <a:buChar char="•"/>
+            </a:pPr>
+            <a:r>
+              <a:rPr lang="nl-NL" sz="2400" dirty="0" smtClean="0"/>
+              <a:t>De ‘integratie’ van de kaartspel elementen </a:t>
+            </a:r>
+          </a:p>
+          <a:p>
+            <a:pPr marL="355600" indent="-355600" algn="l">
+              <a:buFont typeface="Arial" panose="020B0604020202020204" pitchFamily="34" charset="0"/>
+              <a:buChar char="•"/>
+            </a:pPr>
+            <a:r>
+              <a:rPr lang="nl-NL" sz="2400" dirty="0" smtClean="0"/>
+              <a:t>Server </a:t>
+            </a:r>
+            <a:r>
+              <a:rPr lang="nl-NL" sz="2400" dirty="0" err="1" smtClean="0"/>
+              <a:t>based</a:t>
+            </a:r>
+            <a:r>
+              <a:rPr lang="nl-NL" sz="2400" dirty="0" smtClean="0"/>
+              <a:t>! (</a:t>
+            </a:r>
+            <a:r>
+              <a:rPr lang="nl-NL" sz="2400" dirty="0" err="1" smtClean="0"/>
+              <a:t>Servlets</a:t>
+            </a:r>
+            <a:r>
+              <a:rPr lang="nl-NL" sz="2400" dirty="0" smtClean="0"/>
+              <a:t>, </a:t>
+            </a:r>
+            <a:r>
+              <a:rPr lang="nl-NL" sz="2400" dirty="0" err="1" smtClean="0"/>
+              <a:t>JSP’s</a:t>
+            </a:r>
+            <a:r>
+              <a:rPr lang="nl-NL" sz="2400" dirty="0" smtClean="0"/>
+              <a:t>)</a:t>
+            </a:r>
+          </a:p>
+          <a:p>
+            <a:pPr marL="355600" indent="-355600" algn="l">
+              <a:buFont typeface="Arial" panose="020B0604020202020204" pitchFamily="34" charset="0"/>
+              <a:buChar char="•"/>
+            </a:pPr>
+            <a:r>
+              <a:rPr lang="nl-NL" sz="2400" dirty="0" err="1" smtClean="0"/>
+              <a:t>JUnitTests</a:t>
+            </a:r>
+            <a:endParaRPr lang="nl-NL" sz="2400" dirty="0" smtClean="0"/>
+          </a:p>
+          <a:p>
+            <a:pPr marL="355600" indent="-355600" algn="l">
+              <a:buFont typeface="Arial" panose="020B0604020202020204" pitchFamily="34" charset="0"/>
+              <a:buChar char="•"/>
+            </a:pPr>
+            <a:r>
+              <a:rPr lang="nl-NL" sz="2400" dirty="0" smtClean="0"/>
+              <a:t>Samenwerking</a:t>
+            </a:r>
+          </a:p>
+          <a:p>
+            <a:pPr algn="l">
               <a:lnSpc>
                 <a:spcPct val="150000"/>
               </a:lnSpc>
-              <a:buFont typeface="Arial" panose="020B0604020202020204" pitchFamily="34" charset="0"/>
-              <a:buChar char="•"/>
             </a:pPr>
-            <a:r>
-              <a:rPr lang="nl-NL" sz="1600" dirty="0" smtClean="0"/>
-              <a:t>Werkende software </a:t>
-            </a:r>
+            <a:endParaRPr lang="nl-NL" sz="2000" dirty="0" smtClean="0"/>
           </a:p>
           <a:p>
             <a:pPr marL="355600" indent="-355600" algn="l">
@@ -3603,109 +4003,7 @@
               <a:buFont typeface="Arial" panose="020B0604020202020204" pitchFamily="34" charset="0"/>
               <a:buChar char="•"/>
             </a:pPr>
-            <a:r>
-              <a:rPr lang="nl-NL" sz="1600" dirty="0" err="1" smtClean="0"/>
-              <a:t>Artificial</a:t>
-            </a:r>
-            <a:r>
-              <a:rPr lang="nl-NL" sz="1600" dirty="0" smtClean="0"/>
-              <a:t> Intelligence </a:t>
-            </a:r>
-          </a:p>
-          <a:p>
-            <a:pPr marL="355600" indent="-355600" algn="l">
-              <a:lnSpc>
-                <a:spcPct val="150000"/>
-              </a:lnSpc>
-              <a:buFont typeface="Arial" panose="020B0604020202020204" pitchFamily="34" charset="0"/>
-              <a:buChar char="•"/>
-            </a:pPr>
-            <a:r>
-              <a:rPr lang="nl-NL" sz="1600" dirty="0" smtClean="0"/>
-              <a:t>De ‘integratie’ van de kaartspel elementen </a:t>
-            </a:r>
-          </a:p>
-          <a:p>
-            <a:pPr marL="355600" indent="-355600" algn="l">
-              <a:lnSpc>
-                <a:spcPct val="150000"/>
-              </a:lnSpc>
-              <a:buFont typeface="Arial" panose="020B0604020202020204" pitchFamily="34" charset="0"/>
-              <a:buChar char="•"/>
-            </a:pPr>
-            <a:r>
-              <a:rPr lang="nl-NL" sz="1600" dirty="0" smtClean="0"/>
-              <a:t>Server </a:t>
-            </a:r>
-            <a:r>
-              <a:rPr lang="nl-NL" sz="1600" dirty="0" err="1" smtClean="0"/>
-              <a:t>based</a:t>
-            </a:r>
-            <a:r>
-              <a:rPr lang="nl-NL" sz="1600" dirty="0" smtClean="0"/>
-              <a:t>! (</a:t>
-            </a:r>
-            <a:r>
-              <a:rPr lang="nl-NL" sz="1600" dirty="0" err="1" smtClean="0"/>
-              <a:t>Servlets</a:t>
-            </a:r>
-            <a:r>
-              <a:rPr lang="nl-NL" sz="1600" dirty="0" smtClean="0"/>
-              <a:t>, </a:t>
-            </a:r>
-            <a:r>
-              <a:rPr lang="nl-NL" sz="1600" dirty="0" err="1" smtClean="0"/>
-              <a:t>JSP’s</a:t>
-            </a:r>
-            <a:r>
-              <a:rPr lang="nl-NL" sz="1600" dirty="0" smtClean="0"/>
-              <a:t>)</a:t>
-            </a:r>
-          </a:p>
-          <a:p>
-            <a:pPr marL="355600" indent="-355600" algn="l">
-              <a:lnSpc>
-                <a:spcPct val="150000"/>
-              </a:lnSpc>
-              <a:buFont typeface="Arial" panose="020B0604020202020204" pitchFamily="34" charset="0"/>
-              <a:buChar char="•"/>
-            </a:pPr>
-            <a:r>
-              <a:rPr lang="nl-NL" sz="1600" dirty="0" err="1" smtClean="0"/>
-              <a:t>JUnitTests</a:t>
-            </a:r>
-            <a:endParaRPr lang="nl-NL" sz="1600" dirty="0" smtClean="0"/>
-          </a:p>
-          <a:p>
-            <a:pPr marL="355600" indent="-355600" algn="l">
-              <a:lnSpc>
-                <a:spcPct val="150000"/>
-              </a:lnSpc>
-              <a:buFont typeface="Arial" panose="020B0604020202020204" pitchFamily="34" charset="0"/>
-              <a:buChar char="•"/>
-            </a:pPr>
-            <a:r>
-              <a:rPr lang="nl-NL" sz="1600" dirty="0" smtClean="0"/>
-              <a:t>Samenwerking</a:t>
-            </a:r>
-          </a:p>
-          <a:p>
-            <a:pPr algn="l">
-              <a:lnSpc>
-                <a:spcPct val="150000"/>
-              </a:lnSpc>
-            </a:pPr>
-            <a:endParaRPr lang="nl-NL" sz="1600" dirty="0" smtClean="0"/>
-          </a:p>
-          <a:p>
-            <a:pPr marL="355600" indent="-355600" algn="l">
-              <a:lnSpc>
-                <a:spcPct val="150000"/>
-              </a:lnSpc>
-              <a:buFont typeface="Arial" panose="020B0604020202020204" pitchFamily="34" charset="0"/>
-              <a:buChar char="•"/>
-            </a:pPr>
-            <a:endParaRPr lang="nl-NL" sz="1600" dirty="0" smtClean="0"/>
+            <a:endParaRPr lang="nl-NL" sz="2000" dirty="0" smtClean="0"/>
           </a:p>
         </p:txBody>
       </p:sp>
@@ -3719,7 +4017,7 @@
         </p:nvSpPr>
         <p:spPr>
           <a:xfrm>
-            <a:off x="282142" y="1324831"/>
+            <a:off x="282142" y="1218295"/>
             <a:ext cx="2229606" cy="409761"/>
           </a:xfrm>
           <a:prstGeom prst="rect">
@@ -3728,7 +4026,7 @@
         </p:spPr>
         <p:txBody>
           <a:bodyPr vert="horz" lIns="91440" tIns="45720" rIns="91440" bIns="45720" rtlCol="0" anchor="ctr">
-            <a:normAutofit/>
+            <a:noAutofit/>
           </a:bodyPr>
           <a:lstStyle>
             <a:lvl1pPr algn="ctr" defTabSz="914400" rtl="0" eaLnBrk="1" latinLnBrk="0" hangingPunct="1">
@@ -3749,10 +4047,10 @@
           <a:p>
             <a:pPr algn="l"/>
             <a:r>
-              <a:rPr lang="nl-NL" sz="1600" b="1" dirty="0" smtClean="0"/>
+              <a:rPr lang="nl-NL" sz="2400" b="1" dirty="0" smtClean="0"/>
               <a:t>Wat ging goed</a:t>
             </a:r>
-            <a:endParaRPr lang="nl-NL" sz="1600" b="1" dirty="0"/>
+            <a:endParaRPr lang="nl-NL" sz="2400" b="1" dirty="0"/>
           </a:p>
         </p:txBody>
       </p:sp>
@@ -3766,8 +4064,8 @@
         </p:nvSpPr>
         <p:spPr>
           <a:xfrm>
-            <a:off x="283742" y="3827140"/>
-            <a:ext cx="2229606" cy="409761"/>
+            <a:off x="283742" y="4141186"/>
+            <a:ext cx="3352154" cy="409761"/>
           </a:xfrm>
           <a:prstGeom prst="rect">
             <a:avLst/>
@@ -3775,7 +4073,7 @@
         </p:spPr>
         <p:txBody>
           <a:bodyPr vert="horz" lIns="91440" tIns="45720" rIns="91440" bIns="45720" rtlCol="0" anchor="ctr">
-            <a:normAutofit/>
+            <a:noAutofit/>
           </a:bodyPr>
           <a:lstStyle>
             <a:lvl1pPr algn="ctr" defTabSz="914400" rtl="0" eaLnBrk="1" latinLnBrk="0" hangingPunct="1">
@@ -3796,10 +4094,10 @@
           <a:p>
             <a:pPr algn="l"/>
             <a:r>
-              <a:rPr lang="nl-NL" sz="1600" b="1" dirty="0" smtClean="0"/>
+              <a:rPr lang="nl-NL" sz="2400" b="1" dirty="0" smtClean="0"/>
               <a:t>Waar liep we tegen aan</a:t>
             </a:r>
-            <a:endParaRPr lang="nl-NL" sz="1600" b="1" dirty="0"/>
+            <a:endParaRPr lang="nl-NL" sz="2400" b="1" dirty="0"/>
           </a:p>
         </p:txBody>
       </p:sp>
@@ -3813,7 +4111,7 @@
         </p:nvSpPr>
         <p:spPr>
           <a:xfrm>
-            <a:off x="380926" y="4242296"/>
+            <a:off x="380926" y="4609904"/>
             <a:ext cx="7772400" cy="1656010"/>
           </a:xfrm>
           <a:prstGeom prst="rect">
@@ -3822,7 +4120,7 @@
         </p:spPr>
         <p:txBody>
           <a:bodyPr vert="horz" lIns="91440" tIns="45720" rIns="91440" bIns="45720" rtlCol="0" anchor="t" anchorCtr="0">
-            <a:normAutofit fontScale="92500" lnSpcReduction="20000"/>
+            <a:noAutofit/>
           </a:bodyPr>
           <a:lstStyle>
             <a:lvl1pPr algn="ctr" defTabSz="914400" rtl="0" eaLnBrk="1" latinLnBrk="0" hangingPunct="1">
@@ -3842,108 +4140,87 @@
           </a:lstStyle>
           <a:p>
             <a:pPr marL="355600" indent="-355600" algn="l">
-              <a:lnSpc>
-                <a:spcPct val="150000"/>
-              </a:lnSpc>
               <a:buFont typeface="Arial" panose="020B0604020202020204" pitchFamily="34" charset="0"/>
               <a:buChar char="•"/>
             </a:pPr>
             <a:r>
-              <a:rPr lang="nl-NL" sz="1600" dirty="0" smtClean="0"/>
+              <a:rPr lang="nl-NL" sz="2400" dirty="0" smtClean="0"/>
               <a:t>Rommelige </a:t>
             </a:r>
             <a:r>
-              <a:rPr lang="nl-NL" sz="1600" dirty="0" err="1" smtClean="0"/>
+              <a:rPr lang="nl-NL" sz="2400" dirty="0" err="1" smtClean="0"/>
               <a:t>servlet</a:t>
             </a:r>
             <a:r>
-              <a:rPr lang="nl-NL" sz="1600" dirty="0" smtClean="0"/>
+              <a:rPr lang="nl-NL" sz="2400" dirty="0" smtClean="0"/>
               <a:t> architectuur</a:t>
             </a:r>
           </a:p>
           <a:p>
             <a:pPr marL="355600" indent="-355600" algn="l">
-              <a:lnSpc>
-                <a:spcPct val="150000"/>
-              </a:lnSpc>
               <a:buFont typeface="Arial" panose="020B0604020202020204" pitchFamily="34" charset="0"/>
               <a:buChar char="•"/>
             </a:pPr>
             <a:r>
-              <a:rPr lang="nl-NL" sz="1600" dirty="0" err="1" smtClean="0"/>
+              <a:rPr lang="nl-NL" sz="2400" dirty="0" err="1" smtClean="0"/>
               <a:t>Multiplayer</a:t>
             </a:r>
             <a:r>
-              <a:rPr lang="nl-NL" sz="1600" dirty="0" smtClean="0"/>
+              <a:rPr lang="nl-NL" sz="2400" dirty="0" smtClean="0"/>
               <a:t> </a:t>
             </a:r>
           </a:p>
           <a:p>
             <a:pPr marL="355600" indent="-355600" algn="l">
-              <a:lnSpc>
-                <a:spcPct val="150000"/>
-              </a:lnSpc>
               <a:buFont typeface="Arial" panose="020B0604020202020204" pitchFamily="34" charset="0"/>
               <a:buChar char="•"/>
             </a:pPr>
             <a:r>
-              <a:rPr lang="nl-NL" sz="1600" dirty="0" smtClean="0"/>
+              <a:rPr lang="nl-NL" sz="2400" dirty="0" smtClean="0"/>
               <a:t>Berekening score hand (Azen)</a:t>
             </a:r>
           </a:p>
           <a:p>
             <a:pPr marL="355600" indent="-355600" algn="l">
-              <a:lnSpc>
-                <a:spcPct val="150000"/>
-              </a:lnSpc>
               <a:buFont typeface="Arial" panose="020B0604020202020204" pitchFamily="34" charset="0"/>
               <a:buChar char="•"/>
             </a:pPr>
             <a:r>
-              <a:rPr lang="nl-NL" sz="1600" dirty="0" err="1" smtClean="0"/>
+              <a:rPr lang="nl-NL" sz="2400" dirty="0" err="1" smtClean="0"/>
               <a:t>Klikbare</a:t>
             </a:r>
             <a:r>
-              <a:rPr lang="nl-NL" sz="1600" dirty="0" smtClean="0"/>
+              <a:rPr lang="nl-NL" sz="2400" dirty="0" smtClean="0"/>
               <a:t> kaarten</a:t>
             </a:r>
           </a:p>
           <a:p>
             <a:pPr marL="355600" indent="-355600" algn="l">
-              <a:lnSpc>
-                <a:spcPct val="150000"/>
-              </a:lnSpc>
               <a:buFont typeface="Arial" panose="020B0604020202020204" pitchFamily="34" charset="0"/>
               <a:buChar char="•"/>
             </a:pPr>
             <a:r>
-              <a:rPr lang="nl-NL" sz="1600" dirty="0" err="1" smtClean="0"/>
+              <a:rPr lang="nl-NL" sz="2400" dirty="0" err="1" smtClean="0"/>
               <a:t>Merge</a:t>
             </a:r>
             <a:r>
-              <a:rPr lang="nl-NL" sz="1600" dirty="0" smtClean="0"/>
+              <a:rPr lang="nl-NL" sz="2400" dirty="0" smtClean="0"/>
               <a:t> conflicten</a:t>
             </a:r>
           </a:p>
           <a:p>
             <a:pPr marL="355600" indent="-355600" algn="l">
-              <a:lnSpc>
-                <a:spcPct val="150000"/>
-              </a:lnSpc>
               <a:buFont typeface="Arial" panose="020B0604020202020204" pitchFamily="34" charset="0"/>
               <a:buChar char="•"/>
             </a:pPr>
-            <a:endParaRPr lang="nl-NL" sz="1600" dirty="0" smtClean="0"/>
+            <a:endParaRPr lang="nl-NL" sz="2400" dirty="0" smtClean="0"/>
           </a:p>
           <a:p>
             <a:pPr marL="355600" indent="-355600" algn="l">
-              <a:lnSpc>
-                <a:spcPct val="150000"/>
-              </a:lnSpc>
               <a:buFont typeface="Arial" panose="020B0604020202020204" pitchFamily="34" charset="0"/>
               <a:buChar char="•"/>
             </a:pPr>
-            <a:endParaRPr lang="nl-NL" sz="1600" dirty="0" smtClean="0"/>
+            <a:endParaRPr lang="nl-NL" sz="2400" dirty="0" smtClean="0"/>
           </a:p>
         </p:txBody>
       </p:sp>
@@ -3967,7 +4244,7 @@
 </p:sld>
 </file>
 
-<file path=ppt/slides/slide12.xml><?xml version="1.0" encoding="utf-8"?>
+<file path=ppt/slides/slide13.xml><?xml version="1.0" encoding="utf-8"?>
 <p:sld xmlns:a="http://schemas.openxmlformats.org/drawingml/2006/main" xmlns:r="http://schemas.openxmlformats.org/officeDocument/2006/relationships" xmlns:p="http://schemas.openxmlformats.org/presentationml/2006/main">
   <p:cSld>
     <p:spTree>
@@ -3996,8 +4273,8 @@
         </p:nvSpPr>
         <p:spPr>
           <a:xfrm>
-            <a:off x="234627" y="2670820"/>
-            <a:ext cx="8658007" cy="819522"/>
+            <a:off x="234628" y="2670820"/>
+            <a:ext cx="7772400" cy="819522"/>
           </a:xfrm>
         </p:spPr>
         <p:txBody>
@@ -4006,6 +4283,7 @@
           </a:bodyPr>
           <a:lstStyle/>
           <a:p>
+            <a:pPr algn="l"/>
             <a:r>
               <a:rPr lang="nl-NL" sz="3600" dirty="0" smtClean="0"/>
               <a:t>Vragen</a:t>
@@ -4044,69 +4322,10 @@
           </a:fontRef>
         </p:style>
       </p:cxnSp>
-      <p:pic>
-        <p:nvPicPr>
-          <p:cNvPr id="3" name="Afbeelding 2"/>
-          <p:cNvPicPr>
-            <a:picLocks noChangeAspect="1"/>
-          </p:cNvPicPr>
-          <p:nvPr/>
-        </p:nvPicPr>
-        <p:blipFill rotWithShape="1">
-          <a:blip r:embed="rId2" cstate="print">
-            <a:extLst>
-              <a:ext uri="{28A0092B-C50C-407E-A947-70E740481C1C}">
-                <a14:useLocalDpi xmlns:a14="http://schemas.microsoft.com/office/drawing/2010/main" val="0"/>
-              </a:ext>
-            </a:extLst>
-          </a:blip>
-          <a:srcRect t="21965" r="21964"/>
-          <a:stretch/>
-        </p:blipFill>
-        <p:spPr>
-          <a:xfrm>
-            <a:off x="7172283" y="1829031"/>
-            <a:ext cx="1790764" cy="3178606"/>
-          </a:xfrm>
-          <a:prstGeom prst="rect">
-            <a:avLst/>
-          </a:prstGeom>
-        </p:spPr>
-      </p:pic>
-      <p:pic>
-        <p:nvPicPr>
-          <p:cNvPr id="4" name="Afbeelding 3"/>
-          <p:cNvPicPr>
-            <a:picLocks noChangeAspect="1"/>
-          </p:cNvPicPr>
-          <p:nvPr/>
-        </p:nvPicPr>
-        <p:blipFill>
-          <a:blip r:embed="rId3" cstate="print">
-            <a:extLst>
-              <a:ext uri="{28A0092B-C50C-407E-A947-70E740481C1C}">
-                <a14:useLocalDpi xmlns:a14="http://schemas.microsoft.com/office/drawing/2010/main" val="0"/>
-              </a:ext>
-            </a:extLst>
-          </a:blip>
-          <a:stretch>
-            <a:fillRect/>
-          </a:stretch>
-        </p:blipFill>
-        <p:spPr>
-          <a:xfrm>
-            <a:off x="251520" y="1700808"/>
-            <a:ext cx="1790764" cy="3178606"/>
-          </a:xfrm>
-          <a:prstGeom prst="rect">
-            <a:avLst/>
-          </a:prstGeom>
-        </p:spPr>
-      </p:pic>
     </p:spTree>
     <p:extLst>
       <p:ext uri="{BB962C8B-B14F-4D97-AF65-F5344CB8AC3E}">
-        <p14:creationId xmlns:p14="http://schemas.microsoft.com/office/powerpoint/2010/main" val="2936338958"/>
+        <p14:creationId xmlns:p14="http://schemas.microsoft.com/office/powerpoint/2010/main" val="227042715"/>
       </p:ext>
     </p:extLst>
   </p:cSld>
@@ -5352,6 +5571,10 @@
               <a:rPr lang="nl-NL" sz="3600" dirty="0" err="1" smtClean="0"/>
               <a:t>Snippets</a:t>
             </a:r>
+            <a:r>
+              <a:rPr lang="nl-NL" sz="3600" dirty="0" smtClean="0"/>
+              <a:t> (1)</a:t>
+            </a:r>
             <a:endParaRPr lang="nl-NL" sz="3600" dirty="0"/>
           </a:p>
         </p:txBody>
@@ -5386,9 +5609,56 @@
           </a:fontRef>
         </p:style>
       </p:cxnSp>
+      <p:sp>
+        <p:nvSpPr>
+          <p:cNvPr id="9" name="Titel 1"/>
+          <p:cNvSpPr txBox="1">
+            <a:spLocks/>
+          </p:cNvSpPr>
+          <p:nvPr/>
+        </p:nvSpPr>
+        <p:spPr>
+          <a:xfrm>
+            <a:off x="252239" y="1133852"/>
+            <a:ext cx="3931146" cy="409761"/>
+          </a:xfrm>
+          <a:prstGeom prst="rect">
+            <a:avLst/>
+          </a:prstGeom>
+        </p:spPr>
+        <p:txBody>
+          <a:bodyPr vert="horz" lIns="91440" tIns="45720" rIns="91440" bIns="45720" rtlCol="0" anchor="ctr">
+            <a:normAutofit/>
+          </a:bodyPr>
+          <a:lstStyle>
+            <a:lvl1pPr algn="ctr" defTabSz="914400" rtl="0" eaLnBrk="1" latinLnBrk="0" hangingPunct="1">
+              <a:spcBef>
+                <a:spcPct val="0"/>
+              </a:spcBef>
+              <a:buNone/>
+              <a:defRPr sz="4400" kern="1200">
+                <a:solidFill>
+                  <a:schemeClr val="tx1"/>
+                </a:solidFill>
+                <a:latin typeface="+mj-lt"/>
+                <a:ea typeface="+mj-ea"/>
+                <a:cs typeface="+mj-cs"/>
+              </a:defRPr>
+            </a:lvl1pPr>
+          </a:lstStyle>
+          <a:p>
+            <a:pPr algn="l"/>
+            <a:r>
+              <a:rPr lang="nl-NL" sz="2000" dirty="0" smtClean="0"/>
+              <a:t>Hoe sterk is je hand?</a:t>
+            </a:r>
+            <a:endParaRPr lang="nl-NL" sz="2000" dirty="0"/>
+          </a:p>
+        </p:txBody>
+      </p:sp>
       <p:pic>
         <p:nvPicPr>
-          <p:cNvPr id="1027" name="Picture 3"/>
+          <p:cNvPr id="2050" name="Picture 2"/>
           <p:cNvPicPr>
             <a:picLocks noChangeAspect="1" noChangeArrowheads="1"/>
           </p:cNvPicPr>
@@ -5409,8 +5679,8 @@
         </p:blipFill>
         <p:spPr bwMode="auto">
           <a:xfrm>
-            <a:off x="4478820" y="1588843"/>
-            <a:ext cx="4356510" cy="4744194"/>
+            <a:off x="209624" y="1576900"/>
+            <a:ext cx="5133380" cy="4960941"/>
           </a:xfrm>
           <a:prstGeom prst="rect">
             <a:avLst/>
@@ -5440,426 +5710,10 @@
           </a:extLst>
         </p:spPr>
       </p:pic>
-      <p:sp>
-        <p:nvSpPr>
-          <p:cNvPr id="7" name="Titel 1"/>
-          <p:cNvSpPr txBox="1">
-            <a:spLocks/>
-          </p:cNvSpPr>
-          <p:nvPr/>
-        </p:nvSpPr>
-        <p:spPr>
-          <a:xfrm>
-            <a:off x="4433268" y="1119180"/>
-            <a:ext cx="4171180" cy="409761"/>
-          </a:xfrm>
-          <a:prstGeom prst="rect">
-            <a:avLst/>
-          </a:prstGeom>
-        </p:spPr>
-        <p:txBody>
-          <a:bodyPr vert="horz" lIns="91440" tIns="45720" rIns="91440" bIns="45720" rtlCol="0" anchor="ctr">
-            <a:normAutofit/>
-          </a:bodyPr>
-          <a:lstStyle>
-            <a:lvl1pPr algn="ctr" defTabSz="914400" rtl="0" eaLnBrk="1" latinLnBrk="0" hangingPunct="1">
-              <a:spcBef>
-                <a:spcPct val="0"/>
-              </a:spcBef>
-              <a:buNone/>
-              <a:defRPr sz="4400" kern="1200">
-                <a:solidFill>
-                  <a:schemeClr val="tx1"/>
-                </a:solidFill>
-                <a:latin typeface="+mj-lt"/>
-                <a:ea typeface="+mj-ea"/>
-                <a:cs typeface="+mj-cs"/>
-              </a:defRPr>
-            </a:lvl1pPr>
-          </a:lstStyle>
-          <a:p>
-            <a:pPr algn="l"/>
-            <a:r>
-              <a:rPr lang="nl-NL" sz="1600" dirty="0" smtClean="0"/>
-              <a:t>Een stukje code van de poker AI </a:t>
-            </a:r>
-            <a:endParaRPr lang="nl-NL" sz="1600" dirty="0"/>
-          </a:p>
-        </p:txBody>
-      </p:sp>
-      <p:sp>
-        <p:nvSpPr>
-          <p:cNvPr id="9" name="Titel 1"/>
-          <p:cNvSpPr txBox="1">
-            <a:spLocks/>
-          </p:cNvSpPr>
-          <p:nvPr/>
-        </p:nvSpPr>
-        <p:spPr>
-          <a:xfrm>
-            <a:off x="252239" y="1133852"/>
-            <a:ext cx="3931146" cy="409761"/>
-          </a:xfrm>
-          <a:prstGeom prst="rect">
-            <a:avLst/>
-          </a:prstGeom>
-        </p:spPr>
-        <p:txBody>
-          <a:bodyPr vert="horz" lIns="91440" tIns="45720" rIns="91440" bIns="45720" rtlCol="0" anchor="ctr">
-            <a:normAutofit/>
-          </a:bodyPr>
-          <a:lstStyle>
-            <a:lvl1pPr algn="ctr" defTabSz="914400" rtl="0" eaLnBrk="1" latinLnBrk="0" hangingPunct="1">
-              <a:spcBef>
-                <a:spcPct val="0"/>
-              </a:spcBef>
-              <a:buNone/>
-              <a:defRPr sz="4400" kern="1200">
-                <a:solidFill>
-                  <a:schemeClr val="tx1"/>
-                </a:solidFill>
-                <a:latin typeface="+mj-lt"/>
-                <a:ea typeface="+mj-ea"/>
-                <a:cs typeface="+mj-cs"/>
-              </a:defRPr>
-            </a:lvl1pPr>
-          </a:lstStyle>
-          <a:p>
-            <a:pPr algn="l"/>
-            <a:r>
-              <a:rPr lang="nl-NL" sz="1600" dirty="0" smtClean="0"/>
-              <a:t>Hoe sterk is je hand?</a:t>
-            </a:r>
-            <a:endParaRPr lang="nl-NL" sz="1600" dirty="0"/>
-          </a:p>
-        </p:txBody>
-      </p:sp>
-      <p:pic>
-        <p:nvPicPr>
-          <p:cNvPr id="1029" name="Picture 5"/>
-          <p:cNvPicPr>
-            <a:picLocks noChangeAspect="1" noChangeArrowheads="1"/>
-          </p:cNvPicPr>
-          <p:nvPr/>
-        </p:nvPicPr>
-        <p:blipFill>
-          <a:blip r:embed="rId3">
-            <a:extLst>
-              <a:ext uri="{28A0092B-C50C-407E-A947-70E740481C1C}">
-                <a14:useLocalDpi xmlns:a14="http://schemas.microsoft.com/office/drawing/2010/main" val="0"/>
-              </a:ext>
-            </a:extLst>
-          </a:blip>
-          <a:srcRect/>
-          <a:stretch>
-            <a:fillRect/>
-          </a:stretch>
-        </p:blipFill>
-        <p:spPr bwMode="auto">
-          <a:xfrm>
-            <a:off x="305406" y="4843095"/>
-            <a:ext cx="3630911" cy="1657449"/>
-          </a:xfrm>
-          <a:prstGeom prst="rect">
-            <a:avLst/>
-          </a:prstGeom>
-          <a:noFill/>
-          <a:ln>
-            <a:noFill/>
-          </a:ln>
-          <a:extLst>
-            <a:ext uri="{909E8E84-426E-40DD-AFC4-6F175D3DCCD1}">
-              <a14:hiddenFill xmlns:a14="http://schemas.microsoft.com/office/drawing/2010/main">
-                <a:solidFill>
-                  <a:schemeClr val="accent1"/>
-                </a:solidFill>
-              </a14:hiddenFill>
-            </a:ext>
-            <a:ext uri="{91240B29-F687-4F45-9708-019B960494DF}">
-              <a14:hiddenLine xmlns:a14="http://schemas.microsoft.com/office/drawing/2010/main" w="9525">
-                <a:solidFill>
-                  <a:schemeClr val="tx1"/>
-                </a:solidFill>
-                <a:miter lim="800000"/>
-                <a:headEnd/>
-                <a:tailEnd/>
-              </a14:hiddenLine>
-            </a:ext>
-          </a:extLst>
-        </p:spPr>
-      </p:pic>
-      <p:pic>
-        <p:nvPicPr>
-          <p:cNvPr id="1030" name="Picture 6"/>
-          <p:cNvPicPr>
-            <a:picLocks noChangeAspect="1" noChangeArrowheads="1"/>
-          </p:cNvPicPr>
-          <p:nvPr/>
-        </p:nvPicPr>
-        <p:blipFill>
-          <a:blip r:embed="rId4">
-            <a:extLst>
-              <a:ext uri="{28A0092B-C50C-407E-A947-70E740481C1C}">
-                <a14:useLocalDpi xmlns:a14="http://schemas.microsoft.com/office/drawing/2010/main" val="0"/>
-              </a:ext>
-            </a:extLst>
-          </a:blip>
-          <a:srcRect/>
-          <a:stretch>
-            <a:fillRect/>
-          </a:stretch>
-        </p:blipFill>
-        <p:spPr bwMode="auto">
-          <a:xfrm>
-            <a:off x="314475" y="1597347"/>
-            <a:ext cx="1900221" cy="3117933"/>
-          </a:xfrm>
-          <a:prstGeom prst="rect">
-            <a:avLst/>
-          </a:prstGeom>
-          <a:noFill/>
-          <a:ln>
-            <a:noFill/>
-          </a:ln>
-          <a:extLst>
-            <a:ext uri="{909E8E84-426E-40DD-AFC4-6F175D3DCCD1}">
-              <a14:hiddenFill xmlns:a14="http://schemas.microsoft.com/office/drawing/2010/main">
-                <a:solidFill>
-                  <a:schemeClr val="accent1"/>
-                </a:solidFill>
-              </a14:hiddenFill>
-            </a:ext>
-            <a:ext uri="{91240B29-F687-4F45-9708-019B960494DF}">
-              <a14:hiddenLine xmlns:a14="http://schemas.microsoft.com/office/drawing/2010/main" w="9525">
-                <a:solidFill>
-                  <a:schemeClr val="tx1"/>
-                </a:solidFill>
-                <a:miter lim="800000"/>
-                <a:headEnd/>
-                <a:tailEnd/>
-              </a14:hiddenLine>
-            </a:ext>
-          </a:extLst>
-        </p:spPr>
-      </p:pic>
-      <p:sp>
-        <p:nvSpPr>
-          <p:cNvPr id="14" name="Rechthoek 13"/>
-          <p:cNvSpPr/>
-          <p:nvPr/>
-        </p:nvSpPr>
-        <p:spPr>
-          <a:xfrm>
-            <a:off x="305406" y="1561134"/>
-            <a:ext cx="3889730" cy="4939409"/>
-          </a:xfrm>
-          <a:prstGeom prst="rect">
-            <a:avLst/>
-          </a:prstGeom>
-          <a:noFill/>
-          <a:ln w="12700">
-            <a:solidFill>
-              <a:srgbClr val="89C4FF"/>
-            </a:solidFill>
-          </a:ln>
-        </p:spPr>
-        <p:style>
-          <a:lnRef idx="2">
-            <a:schemeClr val="accent1">
-              <a:shade val="50000"/>
-            </a:schemeClr>
-          </a:lnRef>
-          <a:fillRef idx="1">
-            <a:schemeClr val="accent1"/>
-          </a:fillRef>
-          <a:effectRef idx="0">
-            <a:schemeClr val="accent1"/>
-          </a:effectRef>
-          <a:fontRef idx="minor">
-            <a:schemeClr val="lt1"/>
-          </a:fontRef>
-        </p:style>
-        <p:txBody>
-          <a:bodyPr rtlCol="0" anchor="ctr"/>
-          <a:lstStyle/>
-          <a:p>
-            <a:pPr algn="ctr"/>
-            <a:endParaRPr lang="nl-NL"/>
-          </a:p>
-        </p:txBody>
-      </p:sp>
-      <p:sp>
-        <p:nvSpPr>
-          <p:cNvPr id="15" name="Rechthoek 14"/>
-          <p:cNvSpPr/>
-          <p:nvPr/>
-        </p:nvSpPr>
-        <p:spPr>
-          <a:xfrm>
-            <a:off x="387027" y="3678956"/>
-            <a:ext cx="2168749" cy="216000"/>
-          </a:xfrm>
-          <a:prstGeom prst="rect">
-            <a:avLst/>
-          </a:prstGeom>
-          <a:noFill/>
-          <a:ln w="12700">
-            <a:solidFill>
-              <a:srgbClr val="0062C4"/>
-            </a:solidFill>
-          </a:ln>
-        </p:spPr>
-        <p:style>
-          <a:lnRef idx="2">
-            <a:schemeClr val="accent1">
-              <a:shade val="50000"/>
-            </a:schemeClr>
-          </a:lnRef>
-          <a:fillRef idx="1">
-            <a:schemeClr val="accent1"/>
-          </a:fillRef>
-          <a:effectRef idx="0">
-            <a:schemeClr val="accent1"/>
-          </a:effectRef>
-          <a:fontRef idx="minor">
-            <a:schemeClr val="lt1"/>
-          </a:fontRef>
-        </p:style>
-        <p:txBody>
-          <a:bodyPr rtlCol="0" anchor="ctr"/>
-          <a:lstStyle/>
-          <a:p>
-            <a:pPr algn="ctr"/>
-            <a:endParaRPr lang="nl-NL"/>
-          </a:p>
-        </p:txBody>
-      </p:sp>
-      <p:sp>
-        <p:nvSpPr>
-          <p:cNvPr id="16" name="Rechthoek 15"/>
-          <p:cNvSpPr/>
-          <p:nvPr/>
-        </p:nvSpPr>
-        <p:spPr>
-          <a:xfrm>
-            <a:off x="4478820" y="1562661"/>
-            <a:ext cx="4356510" cy="4939409"/>
-          </a:xfrm>
-          <a:prstGeom prst="rect">
-            <a:avLst/>
-          </a:prstGeom>
-          <a:noFill/>
-          <a:ln w="12700">
-            <a:solidFill>
-              <a:srgbClr val="89C4FF"/>
-            </a:solidFill>
-          </a:ln>
-        </p:spPr>
-        <p:style>
-          <a:lnRef idx="2">
-            <a:schemeClr val="accent1">
-              <a:shade val="50000"/>
-            </a:schemeClr>
-          </a:lnRef>
-          <a:fillRef idx="1">
-            <a:schemeClr val="accent1"/>
-          </a:fillRef>
-          <a:effectRef idx="0">
-            <a:schemeClr val="accent1"/>
-          </a:effectRef>
-          <a:fontRef idx="minor">
-            <a:schemeClr val="lt1"/>
-          </a:fontRef>
-        </p:style>
-        <p:txBody>
-          <a:bodyPr rtlCol="0" anchor="ctr"/>
-          <a:lstStyle/>
-          <a:p>
-            <a:pPr algn="ctr"/>
-            <a:endParaRPr lang="nl-NL"/>
-          </a:p>
-        </p:txBody>
-      </p:sp>
-      <p:cxnSp>
-        <p:nvCxnSpPr>
-          <p:cNvPr id="8" name="Rechte verbindingslijn 7"/>
-          <p:cNvCxnSpPr/>
-          <p:nvPr/>
-        </p:nvCxnSpPr>
-        <p:spPr>
-          <a:xfrm>
-            <a:off x="305422" y="4786412"/>
-            <a:ext cx="3889714" cy="0"/>
-          </a:xfrm>
-          <a:prstGeom prst="line">
-            <a:avLst/>
-          </a:prstGeom>
-          <a:ln>
-            <a:solidFill>
-              <a:srgbClr val="89C4FF"/>
-            </a:solidFill>
-            <a:prstDash val="dash"/>
-          </a:ln>
-        </p:spPr>
-        <p:style>
-          <a:lnRef idx="1">
-            <a:schemeClr val="accent1"/>
-          </a:lnRef>
-          <a:fillRef idx="0">
-            <a:schemeClr val="accent1"/>
-          </a:fillRef>
-          <a:effectRef idx="0">
-            <a:schemeClr val="accent1"/>
-          </a:effectRef>
-          <a:fontRef idx="minor">
-            <a:schemeClr val="tx1"/>
-          </a:fontRef>
-        </p:style>
-      </p:cxnSp>
-      <p:cxnSp>
-        <p:nvCxnSpPr>
-          <p:cNvPr id="26" name="Gebogen verbindingslijn 25"/>
-          <p:cNvCxnSpPr>
-            <a:stCxn id="15" idx="1"/>
-          </p:cNvCxnSpPr>
-          <p:nvPr/>
-        </p:nvCxnSpPr>
-        <p:spPr>
-          <a:xfrm rot="10800000" flipV="1">
-            <a:off x="369133" y="3786956"/>
-            <a:ext cx="17895" cy="1165230"/>
-          </a:xfrm>
-          <a:prstGeom prst="bentConnector3">
-            <a:avLst>
-              <a:gd name="adj1" fmla="val 1377452"/>
-            </a:avLst>
-          </a:prstGeom>
-          <a:ln>
-            <a:solidFill>
-              <a:srgbClr val="0062C4"/>
-            </a:solidFill>
-            <a:tailEnd type="triangle"/>
-          </a:ln>
-        </p:spPr>
-        <p:style>
-          <a:lnRef idx="1">
-            <a:schemeClr val="accent1"/>
-          </a:lnRef>
-          <a:fillRef idx="0">
-            <a:schemeClr val="accent1"/>
-          </a:fillRef>
-          <a:effectRef idx="0">
-            <a:schemeClr val="accent1"/>
-          </a:effectRef>
-          <a:fontRef idx="minor">
-            <a:schemeClr val="tx1"/>
-          </a:fontRef>
-        </p:style>
-      </p:cxnSp>
     </p:spTree>
     <p:extLst>
       <p:ext uri="{BB962C8B-B14F-4D97-AF65-F5344CB8AC3E}">
-        <p14:creationId xmlns:p14="http://schemas.microsoft.com/office/powerpoint/2010/main" val="1347874025"/>
+        <p14:creationId xmlns:p14="http://schemas.microsoft.com/office/powerpoint/2010/main" val="3380237605"/>
       </p:ext>
     </p:extLst>
   </p:cSld>
@@ -5918,11 +5772,15 @@
             <a:pPr algn="l"/>
             <a:r>
               <a:rPr lang="nl-NL" sz="3600" dirty="0" smtClean="0"/>
-              <a:t>Poker | </a:t>
+              <a:t>Poker | Code </a:t>
             </a:r>
             <a:r>
               <a:rPr lang="nl-NL" sz="3600" dirty="0" err="1" smtClean="0"/>
-              <a:t>JUnitTest</a:t>
+              <a:t>Snippets</a:t>
+            </a:r>
+            <a:r>
+              <a:rPr lang="nl-NL" sz="3600" dirty="0" smtClean="0"/>
+              <a:t> (2)</a:t>
             </a:r>
             <a:endParaRPr lang="nl-NL" sz="3600" dirty="0"/>
           </a:p>
@@ -5958,9 +5816,56 @@
           </a:fontRef>
         </p:style>
       </p:cxnSp>
+      <p:sp>
+        <p:nvSpPr>
+          <p:cNvPr id="9" name="Titel 1"/>
+          <p:cNvSpPr txBox="1">
+            <a:spLocks/>
+          </p:cNvSpPr>
+          <p:nvPr/>
+        </p:nvSpPr>
+        <p:spPr>
+          <a:xfrm>
+            <a:off x="252239" y="1133852"/>
+            <a:ext cx="3931146" cy="409761"/>
+          </a:xfrm>
+          <a:prstGeom prst="rect">
+            <a:avLst/>
+          </a:prstGeom>
+        </p:spPr>
+        <p:txBody>
+          <a:bodyPr vert="horz" lIns="91440" tIns="45720" rIns="91440" bIns="45720" rtlCol="0" anchor="ctr">
+            <a:normAutofit/>
+          </a:bodyPr>
+          <a:lstStyle>
+            <a:lvl1pPr algn="ctr" defTabSz="914400" rtl="0" eaLnBrk="1" latinLnBrk="0" hangingPunct="1">
+              <a:spcBef>
+                <a:spcPct val="0"/>
+              </a:spcBef>
+              <a:buNone/>
+              <a:defRPr sz="4400" kern="1200">
+                <a:solidFill>
+                  <a:schemeClr val="tx1"/>
+                </a:solidFill>
+                <a:latin typeface="+mj-lt"/>
+                <a:ea typeface="+mj-ea"/>
+                <a:cs typeface="+mj-cs"/>
+              </a:defRPr>
+            </a:lvl1pPr>
+          </a:lstStyle>
+          <a:p>
+            <a:pPr algn="l"/>
+            <a:r>
+              <a:rPr lang="nl-NL" sz="2000" dirty="0" smtClean="0"/>
+              <a:t>Een stukje code van de poker AI</a:t>
+            </a:r>
+            <a:endParaRPr lang="nl-NL" sz="2000" dirty="0"/>
+          </a:p>
+        </p:txBody>
+      </p:sp>
       <p:pic>
         <p:nvPicPr>
-          <p:cNvPr id="2050" name="Picture 2"/>
+          <p:cNvPr id="1026" name="Picture 2"/>
           <p:cNvPicPr>
             <a:picLocks noChangeAspect="1" noChangeArrowheads="1"/>
           </p:cNvPicPr>
@@ -5981,8 +5886,8 @@
         </p:blipFill>
         <p:spPr bwMode="auto">
           <a:xfrm>
-            <a:off x="323527" y="1586384"/>
-            <a:ext cx="8520243" cy="4371404"/>
+            <a:off x="234627" y="1564325"/>
+            <a:ext cx="8520479" cy="5033027"/>
           </a:xfrm>
           <a:prstGeom prst="rect">
             <a:avLst/>
@@ -6012,115 +5917,10 @@
           </a:extLst>
         </p:spPr>
       </p:pic>
-      <p:sp>
-        <p:nvSpPr>
-          <p:cNvPr id="17" name="Titel 1"/>
-          <p:cNvSpPr txBox="1">
-            <a:spLocks/>
-          </p:cNvSpPr>
-          <p:nvPr/>
-        </p:nvSpPr>
-        <p:spPr>
-          <a:xfrm>
-            <a:off x="252239" y="1133852"/>
-            <a:ext cx="3931146" cy="409761"/>
-          </a:xfrm>
-          <a:prstGeom prst="rect">
-            <a:avLst/>
-          </a:prstGeom>
-        </p:spPr>
-        <p:txBody>
-          <a:bodyPr vert="horz" lIns="91440" tIns="45720" rIns="91440" bIns="45720" rtlCol="0" anchor="ctr">
-            <a:normAutofit fontScale="77500" lnSpcReduction="20000"/>
-          </a:bodyPr>
-          <a:lstStyle>
-            <a:lvl1pPr algn="ctr" defTabSz="914400" rtl="0" eaLnBrk="1" latinLnBrk="0" hangingPunct="1">
-              <a:spcBef>
-                <a:spcPct val="0"/>
-              </a:spcBef>
-              <a:buNone/>
-              <a:defRPr sz="4400" kern="1200">
-                <a:solidFill>
-                  <a:schemeClr val="tx1"/>
-                </a:solidFill>
-                <a:latin typeface="+mj-lt"/>
-                <a:ea typeface="+mj-ea"/>
-                <a:cs typeface="+mj-cs"/>
-              </a:defRPr>
-            </a:lvl1pPr>
-          </a:lstStyle>
-          <a:p>
-            <a:pPr algn="l"/>
-            <a:r>
-              <a:rPr lang="nl-NL" sz="1600" dirty="0" smtClean="0"/>
-              <a:t>De </a:t>
-            </a:r>
-            <a:r>
-              <a:rPr lang="nl-NL" sz="1600" dirty="0" err="1" smtClean="0"/>
-              <a:t>getScore</a:t>
-            </a:r>
-            <a:r>
-              <a:rPr lang="nl-NL" sz="1600" dirty="0" smtClean="0"/>
-              <a:t> functie hebben wij uitgebreid getest met </a:t>
-            </a:r>
-            <a:r>
-              <a:rPr lang="nl-NL" sz="1600" dirty="0" err="1" smtClean="0"/>
-              <a:t>JUnit</a:t>
-            </a:r>
-            <a:endParaRPr lang="nl-NL" sz="1600" dirty="0"/>
-          </a:p>
-        </p:txBody>
-      </p:sp>
-      <p:sp>
-        <p:nvSpPr>
-          <p:cNvPr id="18" name="Rechthoek 17"/>
-          <p:cNvSpPr/>
-          <p:nvPr/>
-        </p:nvSpPr>
-        <p:spPr>
-          <a:xfrm>
-            <a:off x="305406" y="1570660"/>
-            <a:ext cx="8538364" cy="4396654"/>
-          </a:xfrm>
-          <a:prstGeom prst="rect">
-            <a:avLst/>
-          </a:prstGeom>
-          <a:noFill/>
-          <a:ln w="12700">
-            <a:solidFill>
-              <a:srgbClr val="89C4FF"/>
-            </a:solidFill>
-          </a:ln>
-        </p:spPr>
-        <p:style>
-          <a:lnRef idx="2">
-            <a:schemeClr val="accent1">
-              <a:shade val="50000"/>
-            </a:schemeClr>
-          </a:lnRef>
-          <a:fillRef idx="1">
-            <a:schemeClr val="accent1"/>
-          </a:fillRef>
-          <a:effectRef idx="0">
-            <a:schemeClr val="accent1"/>
-          </a:effectRef>
-          <a:fontRef idx="minor">
-            <a:schemeClr val="lt1"/>
-          </a:fontRef>
-        </p:style>
-        <p:txBody>
-          <a:bodyPr rtlCol="0" anchor="ctr"/>
-          <a:lstStyle/>
-          <a:p>
-            <a:pPr algn="ctr"/>
-            <a:endParaRPr lang="nl-NL"/>
-          </a:p>
-        </p:txBody>
-      </p:sp>
     </p:spTree>
     <p:extLst>
       <p:ext uri="{BB962C8B-B14F-4D97-AF65-F5344CB8AC3E}">
-        <p14:creationId xmlns:p14="http://schemas.microsoft.com/office/powerpoint/2010/main" val="4030620261"/>
+        <p14:creationId xmlns:p14="http://schemas.microsoft.com/office/powerpoint/2010/main" val="2734835062"/>
       </p:ext>
     </p:extLst>
   </p:cSld>

</xml_diff>